<commit_message>
modified ppt generator and script generator and working on audio generator
</commit_message>
<xml_diff>
--- a/assets/ppts/GeneratedPresentation.pptx
+++ b/assets/ppts/GeneratedPresentation.pptx
@@ -3140,11 +3140,13 @@
           </a:bodyPr>
           <a:lstStyle/>
           <a:p>
-            <a:pPr>
-              <a:defRPr sz="2400"/>
-            </a:pPr>
-            <a:r>
-              <a:t>1. Rate of Reaction</a:t>
+            <a:r>
+              <a:rPr b="1" sz="4000">
+                <a:solidFill>
+                  <a:srgbClr val="000000"/>
+                </a:solidFill>
+              </a:rPr>
+              <a:t>1. Choosing a Niche or Topic</a:t>
             </a:r>
           </a:p>
         </p:txBody>
@@ -3171,21 +3173,8 @@
           </a:bodyPr>
           <a:lstStyle/>
           <a:p>
-            <a:pPr>
-              <a:defRPr sz="1800"/>
-            </a:pPr>
-            <a:r>
-              <a:t>1. The rate of reaction refers to the speed at which reactants are converted into products.</a:t>
-            </a:r>
-          </a:p>
-          <a:p>
-            <a:r>
-              <a:t>2. The rate of reaction can be affected by various factors including the nature of the reaction, the physical state of reactants, concentration, pressure, temperature, and the presence of a solvent or electromagnetic radiation.</a:t>
-            </a:r>
-          </a:p>
-          <a:p>
-            <a:r>
-              <a:t>3. The rate of reaction can be increased by increasing the concentration of reactants, applying pressure, increasing temperature, and exposing the reactants to electromagnetic radiation.</a:t>
+            <a:r>
+              <a:t>1. Choosing a niche or topic is a crucial step in creating profitable digital products., 2. Having one specific niche is essential for success, as it helps differentiate your products from others., 3. To choose a profitable niche, you need to consider both forethought and research, including identifying problems people are experiencing and determining whether you can solve them., 4. Researching your competition and analyzing their strengths and weaknesses is also vital in choosing a niche.</a:t>
             </a:r>
           </a:p>
         </p:txBody>
@@ -3207,7 +3196,7 @@
         <p:spPr>
           <a:xfrm>
             <a:off x="5943600" y="1371600"/>
-            <a:ext cx="2743200" cy="1829773"/>
+            <a:ext cx="2743200" cy="1543780"/>
           </a:xfrm>
           <a:prstGeom prst="rect">
             <a:avLst/>
@@ -3271,11 +3260,13 @@
           </a:bodyPr>
           <a:lstStyle/>
           <a:p>
-            <a:pPr>
-              <a:defRPr sz="2400"/>
-            </a:pPr>
-            <a:r>
-              <a:t>5. Activation Energy</a:t>
+            <a:r>
+              <a:rPr b="1" sz="4000">
+                <a:solidFill>
+                  <a:srgbClr val="000000"/>
+                </a:solidFill>
+              </a:rPr>
+              <a:t>5. Building an Audience and Engagement</a:t>
             </a:r>
           </a:p>
         </p:txBody>
@@ -3302,11 +3293,18 @@
           </a:bodyPr>
           <a:lstStyle/>
           <a:p>
-            <a:pPr>
-              <a:defRPr sz="1800"/>
-            </a:pPr>
-            <a:r>
-              <a:t>3. The Arrhenius equation gives the quantitative basis of the relationship between the activation energy and the rate at which a reaction proceeds.</a:t>
+            <a:r>
+              <a:t>3. Using tools like journey maps, customer surveys, and marketing automation software can help businesses connect with their target audience.</a:t>
+            </a:r>
+          </a:p>
+          <a:p>
+            <a:r>
+              <a:t>4. Key metrics to track for audience engagement include page views, email opens, and Twitter interactions.</a:t>
+            </a:r>
+          </a:p>
+          <a:p>
+            <a:r>
+              <a:t>5. Businesses should align their engagement strategy with their company goals and image.</a:t>
             </a:r>
           </a:p>
         </p:txBody>
@@ -3328,7 +3326,7 @@
         <p:spPr>
           <a:xfrm>
             <a:off x="5943600" y="1371600"/>
-            <a:ext cx="2743200" cy="3496235"/>
+            <a:ext cx="2743200" cy="4117968"/>
           </a:xfrm>
           <a:prstGeom prst="rect">
             <a:avLst/>
@@ -3392,11 +3390,13 @@
           </a:bodyPr>
           <a:lstStyle/>
           <a:p>
-            <a:pPr>
-              <a:defRPr sz="2400"/>
-            </a:pPr>
-            <a:r>
-              <a:t>6. Order of Reaction</a:t>
+            <a:r>
+              <a:rPr b="1" sz="4000">
+                <a:solidFill>
+                  <a:srgbClr val="000000"/>
+                </a:solidFill>
+              </a:rPr>
+              <a:t>6. Monetizing Your Channel</a:t>
             </a:r>
           </a:p>
         </p:txBody>
@@ -3423,21 +3423,13 @@
           </a:bodyPr>
           <a:lstStyle/>
           <a:p>
-            <a:pPr>
-              <a:defRPr sz="1800"/>
-            </a:pPr>
-            <a:r>
-              <a:t>1. The order of reaction refers to the relationship between the rate of a chemical reaction and the concentration of the species taking part in it.</a:t>
-            </a:r>
-          </a:p>
-          <a:p>
-            <a:r>
-              <a:t>          2. The reaction order represents the number of species whose concentration directly affects the rate of reaction.</a:t>
-            </a:r>
-          </a:p>
-          <a:p>
-            <a:r>
-              <a:t>          3. The order of reaction can have a value of zero, and it can be in the form of an integer or a fraction.</a:t>
+            <a:r>
+              <a:t>1. You can monetize your YouTube channel without making videos by leveraging various monetization strategies.</a:t>
+            </a:r>
+          </a:p>
+          <a:p>
+            <a:r>
+              <a:t>2. To join the YouTube Partner Program, you need to reach milestones of 1,000 subscribers and 4,000 hours of watch time.</a:t>
             </a:r>
           </a:p>
         </p:txBody>
@@ -3459,7 +3451,7 @@
         <p:spPr>
           <a:xfrm>
             <a:off x="5943600" y="1371600"/>
-            <a:ext cx="2743200" cy="4117968"/>
+            <a:ext cx="2743200" cy="1829773"/>
           </a:xfrm>
           <a:prstGeom prst="rect">
             <a:avLst/>
@@ -3523,11 +3515,13 @@
           </a:bodyPr>
           <a:lstStyle/>
           <a:p>
-            <a:pPr>
-              <a:defRPr sz="2400"/>
-            </a:pPr>
-            <a:r>
-              <a:t>6. Order of Reaction</a:t>
+            <a:r>
+              <a:rPr b="1" sz="4000">
+                <a:solidFill>
+                  <a:srgbClr val="000000"/>
+                </a:solidFill>
+              </a:rPr>
+              <a:t>6. Monetizing Your Channel</a:t>
             </a:r>
           </a:p>
         </p:txBody>
@@ -3554,26 +3548,18 @@
           </a:bodyPr>
           <a:lstStyle/>
           <a:p>
-            <a:pPr>
-              <a:defRPr sz="1800"/>
-            </a:pPr>
-            <a:r>
-              <a:t>1. The reaction order represents the number of species whose concentration directly affects the rate of reaction.</a:t>
-            </a:r>
-          </a:p>
-          <a:p>
-            <a:r>
-              <a:t>          2. The order of reaction can have a value of zero, and it can be in the form of an integer or a fraction.</a:t>
-            </a:r>
-          </a:p>
-          <a:p>
-            <a:r>
-              <a:t>          3. The initial rates method involves measuring the initial rate of a reaction at different concentrations of each reactant.</a:t>
-            </a:r>
-          </a:p>
-          <a:p>
-            <a:r>
-              <a:t>          4. The differential method is the easiest way to obtain the order of reaction.</a:t>
+            <a:r>
+              <a:t>3. Digital products, such as online courses, ebooks, and software, offer a significant opportunity for monetization through affiliate marketing.</a:t>
+            </a:r>
+          </a:p>
+          <a:p>
+            <a:r>
+              <a:t>4. Choosing the right niche is crucial for successful monetization, with key criteria including being evergreen, having high demand, and high CPM potential.</a:t>
+            </a:r>
+          </a:p>
+          <a:p>
+            <a:r>
+              <a:t>5. Platforms like ClickBank and Digistore24 offer a wide range of products to promote in various niches, facilitating affiliate marketing.</a:t>
             </a:r>
           </a:p>
         </p:txBody>
@@ -3595,7 +3581,7 @@
         <p:spPr>
           <a:xfrm>
             <a:off x="5943600" y="1371600"/>
-            <a:ext cx="2743200" cy="3653852"/>
+            <a:ext cx="2743200" cy="1829773"/>
           </a:xfrm>
           <a:prstGeom prst="rect">
             <a:avLst/>
@@ -3659,11 +3645,13 @@
           </a:bodyPr>
           <a:lstStyle/>
           <a:p>
-            <a:pPr>
-              <a:defRPr sz="2400"/>
-            </a:pPr>
-            <a:r>
-              <a:t>7. Molecularity</a:t>
+            <a:r>
+              <a:rPr b="1" sz="4000">
+                <a:solidFill>
+                  <a:srgbClr val="000000"/>
+                </a:solidFill>
+              </a:rPr>
+              <a:t>7. Promoting Your YouTube Channel</a:t>
             </a:r>
           </a:p>
         </p:txBody>
@@ -3690,16 +3678,18 @@
           </a:bodyPr>
           <a:lstStyle/>
           <a:p>
-            <a:pPr>
-              <a:defRPr sz="1800"/>
-            </a:pPr>
-            <a:r>
-              <a:t>1. Molecularity is the number of molecules that come together to react in an elementary reaction.</a:t>
-            </a:r>
-          </a:p>
-          <a:p>
-            <a:r>
-              <a:t>2. The kinetic order of an elementary reaction or reaction step is equal to its molecularity.</a:t>
+            <a:r>
+              <a:t>1. A YouTube channel can be promoted on various social media platforms, including Instagram, Facebook, TikTok, Pinterest, and Twitter.</a:t>
+            </a:r>
+          </a:p>
+          <a:p>
+            <a:r>
+              <a:t>2. Optimizing your YouTube content with search-friendly keywords can help your videos show up in YouTube search results and on Google.</a:t>
+            </a:r>
+          </a:p>
+          <a:p>
+            <a:r>
+              <a:t>3. Creating a community around your YouTube channel is essential for keeping viewers engaged and coming back for more.</a:t>
             </a:r>
           </a:p>
         </p:txBody>
@@ -3785,11 +3775,13 @@
           </a:bodyPr>
           <a:lstStyle/>
           <a:p>
-            <a:pPr>
-              <a:defRPr sz="2400"/>
-            </a:pPr>
-            <a:r>
-              <a:t>7. Molecularity</a:t>
+            <a:r>
+              <a:rPr b="1" sz="4000">
+                <a:solidFill>
+                  <a:srgbClr val="000000"/>
+                </a:solidFill>
+              </a:rPr>
+              <a:t>7. Promoting Your YouTube Channel</a:t>
             </a:r>
           </a:p>
         </p:txBody>
@@ -3816,11 +3808,13 @@
           </a:bodyPr>
           <a:lstStyle/>
           <a:p>
-            <a:pPr>
-              <a:defRPr sz="1800"/>
-            </a:pPr>
-            <a:r>
-              <a:t>1. Molecularity is only useful to describe elementary reactions or steps.</a:t>
+            <a:r>
+              <a:t>4. Promoting your channel, not just your videos, can help increase your views and improve your return on investment (ROI).</a:t>
+            </a:r>
+          </a:p>
+          <a:p>
+            <a:r>
+              <a:t>5. Building a community and engaging with your audience can help you understand what works and do more of it to improve your YouTube strategy.</a:t>
             </a:r>
           </a:p>
         </p:txBody>
@@ -3842,7 +3836,7 @@
         <p:spPr>
           <a:xfrm>
             <a:off x="5943600" y="1371600"/>
-            <a:ext cx="2743200" cy="4117968"/>
+            <a:ext cx="2743200" cy="1829773"/>
           </a:xfrm>
           <a:prstGeom prst="rect">
             <a:avLst/>
@@ -3906,11 +3900,13 @@
           </a:bodyPr>
           <a:lstStyle/>
           <a:p>
-            <a:pPr>
-              <a:defRPr sz="2400"/>
-            </a:pPr>
-            <a:r>
-              <a:t>1. Rate of Reaction</a:t>
+            <a:r>
+              <a:rPr b="1" sz="4000">
+                <a:solidFill>
+                  <a:srgbClr val="000000"/>
+                </a:solidFill>
+              </a:rPr>
+              <a:t>1. Choosing a Niche or Topic</a:t>
             </a:r>
           </a:p>
         </p:txBody>
@@ -3937,31 +3933,8 @@
           </a:bodyPr>
           <a:lstStyle/>
           <a:p>
-            <a:pPr>
-              <a:defRPr sz="1800"/>
-            </a:pPr>
-            <a:r>
-              <a:t>2. Concentration is another factor that affects the rate of reaction. According to the collision theory, the rate of reaction increases with the increase in concentration of the reactants. </a:t>
-            </a:r>
-          </a:p>
-          <a:p>
-            <a:r>
-              <a:t>3. Pressure also plays a role in the rate of reaction. When we increase the pressure of a gas, we increase the concentration of the gas molecules. </a:t>
-            </a:r>
-          </a:p>
-          <a:p>
-            <a:r>
-              <a:t>4. Temperature is another critical factor that affects the rate of reaction. According to the collision theory, a chemical reaction that takes place at a higher temperature generates more energy than a reaction at a lower temperature.</a:t>
-            </a:r>
-          </a:p>
-          <a:p>
-            <a:r>
-              <a:t>5. The properties of the solvent and its ionic strength can both affect the rate of reaction. For example, a solvent with a high dielectric constant can help to stabilize charged particles, leading to a faster reaction.</a:t>
-            </a:r>
-          </a:p>
-          <a:p>
-            <a:r>
-              <a:t>6. Finally, let's not forget about the order of reaction. This refers to how the reactant pressure or concentration affects the rate of reaction.</a:t>
+            <a:r>
+              <a:t>5. A niche with low-quality content or a lack of competition can be an opportunity for success.</a:t>
             </a:r>
           </a:p>
         </p:txBody>
@@ -4047,11 +4020,13 @@
           </a:bodyPr>
           <a:lstStyle/>
           <a:p>
-            <a:pPr>
-              <a:defRPr sz="2400"/>
-            </a:pPr>
-            <a:r>
-              <a:t>2. Reaction Mechanisms</a:t>
+            <a:r>
+              <a:rPr b="1" sz="4000">
+                <a:solidFill>
+                  <a:srgbClr val="000000"/>
+                </a:solidFill>
+              </a:rPr>
+              <a:t>2. Setting Up a YouTube Account</a:t>
             </a:r>
           </a:p>
         </p:txBody>
@@ -4078,11 +4053,18 @@
           </a:bodyPr>
           <a:lstStyle/>
           <a:p>
-            <a:pPr>
-              <a:defRPr sz="1800"/>
-            </a:pPr>
-            <a:r>
-              <a:t>1. In an addition-elimination reaction of tri-n-butyltin radical with a nitro compound, the first step is the addition of the radical to one of the oxygen atoms in the nitro group.</a:t>
+            <a:r>
+              <a:t>1. To create a YouTube account, you need to visit the YouTube website at https://www.youtube.com and click on the "Sign in" button, then select "Create account".</a:t>
+            </a:r>
+          </a:p>
+          <a:p>
+            <a:r>
+              <a:t>2. If you already have a Google account, you can automatically create a YouTube account by logging in with your Google credentials.</a:t>
+            </a:r>
+          </a:p>
+          <a:p>
+            <a:r>
+              <a:t>3. Children must be at least 13 years old to create a YouTube account, and you'll need to agree to Google's terms of service to create an account.</a:t>
             </a:r>
           </a:p>
         </p:txBody>
@@ -4104,7 +4086,7 @@
         <p:spPr>
           <a:xfrm>
             <a:off x="5943600" y="1371600"/>
-            <a:ext cx="2743200" cy="1818100"/>
+            <a:ext cx="2743200" cy="1829773"/>
           </a:xfrm>
           <a:prstGeom prst="rect">
             <a:avLst/>
@@ -4168,11 +4150,13 @@
           </a:bodyPr>
           <a:lstStyle/>
           <a:p>
-            <a:pPr>
-              <a:defRPr sz="2400"/>
-            </a:pPr>
-            <a:r>
-              <a:t>2. Reaction Mechanisms</a:t>
+            <a:r>
+              <a:rPr b="1" sz="4000">
+                <a:solidFill>
+                  <a:srgbClr val="000000"/>
+                </a:solidFill>
+              </a:rPr>
+              <a:t>2. Setting Up a YouTube Account</a:t>
             </a:r>
           </a:p>
         </p:txBody>
@@ -4199,11 +4183,18 @@
           </a:bodyPr>
           <a:lstStyle/>
           <a:p>
-            <a:pPr>
-              <a:defRPr sz="1800"/>
-            </a:pPr>
-            <a:r>
-              <a:t>2. The reaction mechanism for c-nitro compounds involves more varied possibilities after the initial addition, including breaking the C-N bond, cleaving an O-N bond to form a nitroso compound, or abstracting a hydrogen atom from an available donor. 3. Electron transfer between the tri-n-butyltin radical and a c-nitro compound is endothermic by at least 12 kcal/mol, making it inconsistent with the large rate constant observed for the reaction.</a:t>
+            <a:r>
+              <a:t>4. When creating an account on mobile, you can tap the profile icon, then select "Add account" and follow the prompts to create a new account.</a:t>
+            </a:r>
+          </a:p>
+          <a:p>
+            <a:r>
+              <a:t>5. To create a strong password, it's recommended to use a mix of letters, numbers, and symbols to prevent hackers.</a:t>
+            </a:r>
+          </a:p>
+          <a:p>
+            <a:r>
+              <a:t>6. In addition to your password, you may also be asked to enter a recovery email and phone number. This is optional, but it can help you recover your account if you forget your password or need to verify your identity.</a:t>
             </a:r>
           </a:p>
         </p:txBody>
@@ -4225,7 +4216,7 @@
         <p:spPr>
           <a:xfrm>
             <a:off x="5943600" y="1371600"/>
-            <a:ext cx="2743200" cy="4117968"/>
+            <a:ext cx="2743200" cy="1829773"/>
           </a:xfrm>
           <a:prstGeom prst="rect">
             <a:avLst/>
@@ -4289,11 +4280,13 @@
           </a:bodyPr>
           <a:lstStyle/>
           <a:p>
-            <a:pPr>
-              <a:defRPr sz="2400"/>
-            </a:pPr>
-            <a:r>
-              <a:t>3. Catalysts and Inhibitors</a:t>
+            <a:r>
+              <a:rPr b="1" sz="4000">
+                <a:solidFill>
+                  <a:srgbClr val="000000"/>
+                </a:solidFill>
+              </a:rPr>
+              <a:t>3. Creating High-Quality Content</a:t>
             </a:r>
           </a:p>
         </p:txBody>
@@ -4320,16 +4313,13 @@
           </a:bodyPr>
           <a:lstStyle/>
           <a:p>
-            <a:pPr>
-              <a:defRPr sz="1800"/>
-            </a:pPr>
-            <a:r>
-              <a:t>1. A catalyst is a chemical compound that can increase the rate of a reaction without itself being consumed, and it can continue to act repeatedly.</a:t>
-            </a:r>
-          </a:p>
-          <a:p>
-            <a:r>
-              <a:t>            2. A catalyst can reduce the activation energy of a reaction.</a:t>
+            <a:r>
+              <a:t>1. High-quality content is defined as content that achieves its marketing goals.</a:t>
+            </a:r>
+          </a:p>
+          <a:p>
+            <a:r>
+              <a:t>2. Key characteristics of high-quality content include being comprehensive, useful, helpful, educational, and accurate.</a:t>
             </a:r>
           </a:p>
         </p:txBody>
@@ -4351,7 +4341,7 @@
         <p:spPr>
           <a:xfrm>
             <a:off x="5943600" y="1371600"/>
-            <a:ext cx="2743200" cy="1829773"/>
+            <a:ext cx="2743200" cy="3429000"/>
           </a:xfrm>
           <a:prstGeom prst="rect">
             <a:avLst/>
@@ -4415,11 +4405,13 @@
           </a:bodyPr>
           <a:lstStyle/>
           <a:p>
-            <a:pPr>
-              <a:defRPr sz="2400"/>
-            </a:pPr>
-            <a:r>
-              <a:t>3. Catalysts and Inhibitors</a:t>
+            <a:r>
+              <a:rPr b="1" sz="4000">
+                <a:solidFill>
+                  <a:srgbClr val="000000"/>
+                </a:solidFill>
+              </a:rPr>
+              <a:t>3. Creating High-Quality Content</a:t>
             </a:r>
           </a:p>
         </p:txBody>
@@ -4446,16 +4438,18 @@
           </a:bodyPr>
           <a:lstStyle/>
           <a:p>
-            <a:pPr>
-              <a:defRPr sz="1800"/>
-            </a:pPr>
-            <a:r>
-              <a:t>3. Catalysts and inhibitors participate in chemical reactions but are not consumed, and they show opposite activity in biological and chemical systems.</a:t>
-            </a:r>
-          </a:p>
-          <a:p>
-            <a:r>
-              <a:t>            2. An inhibitor is a chemical compound that can either stop or decrease the reaction rate of a chemical reaction, and it can reduce the activity of a catalyst as well.</a:t>
+            <a:r>
+              <a:t>3. The success of content is measured by various key performance indicators (KPIs) such as ranking in the top three of Google for target keywords, increasing brand awareness, generating leads, and improving click-through rates.</a:t>
+            </a:r>
+          </a:p>
+          <a:p>
+            <a:r>
+              <a:t>4. Understanding search intent and call-to-action is crucial in creating high-quality content.</a:t>
+            </a:r>
+          </a:p>
+          <a:p>
+            <a:r>
+              <a:t>5. Proper formatting for readability is essential to make content easily digestible for both consumers and search engines.</a:t>
             </a:r>
           </a:p>
         </p:txBody>
@@ -4541,11 +4535,13 @@
           </a:bodyPr>
           <a:lstStyle/>
           <a:p>
-            <a:pPr>
-              <a:defRPr sz="2400"/>
-            </a:pPr>
-            <a:r>
-              <a:t>4. Temperature Effects</a:t>
+            <a:r>
+              <a:rPr b="1" sz="4000">
+                <a:solidFill>
+                  <a:srgbClr val="000000"/>
+                </a:solidFill>
+              </a:rPr>
+              <a:t>4. Optimizing Video Titles and Tags</a:t>
             </a:r>
           </a:p>
         </p:txBody>
@@ -4572,21 +4568,18 @@
           </a:bodyPr>
           <a:lstStyle/>
           <a:p>
-            <a:pPr>
-              <a:defRPr sz="1800"/>
-            </a:pPr>
-            <a:r>
-              <a:t>1. Rising temperatures are causing global warming, which is significantly affecting communities, health, and climate. </a:t>
-            </a:r>
-          </a:p>
-          <a:p>
-            <a:r>
-              <a:t>       2. The Earth is experiencing a steady increase in thermometer readings since the industrial revolution, leading to extreme weather, longer wildfire seasons, and frequent heat waves.</a:t>
-            </a:r>
-          </a:p>
-          <a:p>
-            <a:r>
-              <a:t>       3. The rise in sea levels and increased risk of coastal flooding are also consequences of rising temperatures.</a:t>
+            <a:r>
+              <a:t>1. Optimizing video titles should include relevant keywords early in the title to improve its visibility in search results.</a:t>
+            </a:r>
+          </a:p>
+          <a:p>
+            <a:r>
+              <a:t>2. Video descriptions should be comprehensive, include timestamps, links and CTAs, and relevant hashtags.</a:t>
+            </a:r>
+          </a:p>
+          <a:p>
+            <a:r>
+              <a:t>3. Strategic use of tags involves choosing specific and relevant keywords as tags, using a mix of broad and long-tail keywords.</a:t>
             </a:r>
           </a:p>
         </p:txBody>
@@ -4608,7 +4601,7 @@
         <p:spPr>
           <a:xfrm>
             <a:off x="5943600" y="1371600"/>
-            <a:ext cx="2743200" cy="1791835"/>
+            <a:ext cx="2743200" cy="2058984"/>
           </a:xfrm>
           <a:prstGeom prst="rect">
             <a:avLst/>
@@ -4672,11 +4665,13 @@
           </a:bodyPr>
           <a:lstStyle/>
           <a:p>
-            <a:pPr>
-              <a:defRPr sz="2400"/>
-            </a:pPr>
-            <a:r>
-              <a:t>4. Temperature Effects</a:t>
+            <a:r>
+              <a:rPr b="1" sz="4000">
+                <a:solidFill>
+                  <a:srgbClr val="000000"/>
+                </a:solidFill>
+              </a:rPr>
+              <a:t>4. Optimizing Video Titles and Tags</a:t>
             </a:r>
           </a:p>
         </p:txBody>
@@ -4703,15 +4698,41 @@
           </a:bodyPr>
           <a:lstStyle/>
           <a:p>
-            <a:pPr>
-              <a:defRPr sz="1800"/>
-            </a:pPr>
-            <a:r>
-              <a:t>BLANK_SLIDE</a:t>
-            </a:r>
-          </a:p>
-        </p:txBody>
-      </p:sp>
+            <a:r>
+              <a:t>4. Consistency in using tags across related videos strengthens a channel's thematic relevance.</a:t>
+            </a:r>
+          </a:p>
+          <a:p>
+            <a:r>
+              <a:t>5. Regularly reviewing and refining titles, descriptions, and tags based on performance metrics and audience feedback is essential.</a:t>
+            </a:r>
+          </a:p>
+        </p:txBody>
+      </p:sp>
+      <p:pic>
+        <p:nvPicPr>
+          <p:cNvPr id="5" name="Picture 4" descr="image.jpg"/>
+          <p:cNvPicPr>
+            <a:picLocks noChangeAspect="1"/>
+          </p:cNvPicPr>
+          <p:nvPr/>
+        </p:nvPicPr>
+        <p:blipFill>
+          <a:blip r:embed="rId2"/>
+          <a:stretch>
+            <a:fillRect/>
+          </a:stretch>
+        </p:blipFill>
+        <p:spPr>
+          <a:xfrm>
+            <a:off x="5943600" y="1371600"/>
+            <a:ext cx="2743200" cy="4117968"/>
+          </a:xfrm>
+          <a:prstGeom prst="rect">
+            <a:avLst/>
+          </a:prstGeom>
+        </p:spPr>
+      </p:pic>
     </p:spTree>
   </p:cSld>
   <p:clrMapOvr>
@@ -4769,11 +4790,13 @@
           </a:bodyPr>
           <a:lstStyle/>
           <a:p>
-            <a:pPr>
-              <a:defRPr sz="2400"/>
-            </a:pPr>
-            <a:r>
-              <a:t>5. Activation Energy</a:t>
+            <a:r>
+              <a:rPr b="1" sz="4000">
+                <a:solidFill>
+                  <a:srgbClr val="000000"/>
+                </a:solidFill>
+              </a:rPr>
+              <a:t>5. Building an Audience and Engagement</a:t>
             </a:r>
           </a:p>
         </p:txBody>
@@ -4800,16 +4823,13 @@
           </a:bodyPr>
           <a:lstStyle/>
           <a:p>
-            <a:pPr>
-              <a:defRPr sz="1800"/>
-            </a:pPr>
-            <a:r>
-              <a:t>1. Activation energy is the minimum amount of energy that must be provided for compounds to result in a chemical reaction.</a:t>
-            </a:r>
-          </a:p>
-          <a:p>
-            <a:r>
-              <a:t>2. Activation energy can be thought of as the magnitude of the potential barrier separating minima of the potential energy surface pertaining to the initial and final thermodynamic state.</a:t>
+            <a:r>
+              <a:t>1. An engaged audience is critical to any brand's marketing success.</a:t>
+            </a:r>
+          </a:p>
+          <a:p>
+            <a:r>
+              <a:t>2. Experts recommend surveying your audience to understand their needs and preferences.</a:t>
             </a:r>
           </a:p>
         </p:txBody>
@@ -4831,7 +4851,7 @@
         <p:spPr>
           <a:xfrm>
             <a:off x="5943600" y="1371600"/>
-            <a:ext cx="2743200" cy="4871803"/>
+            <a:ext cx="2743200" cy="4117968"/>
           </a:xfrm>
           <a:prstGeom prst="rect">
             <a:avLst/>

</xml_diff>